<commit_message>
Final Commit after Deploying Site
</commit_message>
<xml_diff>
--- a/Bank Churn Predictions.pptx
+++ b/Bank Churn Predictions.pptx
@@ -9689,7 +9689,19 @@
                 <a:cs typeface="Old Standard TT"/>
                 <a:sym typeface="Old Standard TT"/>
               </a:rPr>
-              <a:t>Novemeber 20, 2024</a:t>
+              <a:t>Novemeber 20</a:t>
+            </a:r>
+            <a:r>
+              <a:rPr lang="en" sz="2000">
+                <a:solidFill>
+                  <a:schemeClr val="accent3"/>
+                </a:solidFill>
+                <a:latin typeface="Old Standard TT"/>
+                <a:ea typeface="Old Standard TT"/>
+                <a:cs typeface="Old Standard TT"/>
+                <a:sym typeface="Old Standard TT"/>
+              </a:rPr>
+              <a:t>, 2023</a:t>
             </a:r>
             <a:endParaRPr sz="2000" dirty="0">
               <a:solidFill>

</xml_diff>